<commit_message>
xiaotao update figure 2
</commit_message>
<xml_diff>
--- a/3_materials/MD7115-Xiaotao.pptx
+++ b/3_materials/MD7115-Xiaotao.pptx
@@ -15,6 +15,11 @@
     <p:sldId id="263" r:id="rId9"/>
     <p:sldId id="264" r:id="rId10"/>
     <p:sldId id="265" r:id="rId11"/>
+    <p:sldId id="266" r:id="rId12"/>
+    <p:sldId id="267" r:id="rId13"/>
+    <p:sldId id="268" r:id="rId14"/>
+    <p:sldId id="269" r:id="rId15"/>
+    <p:sldId id="270" r:id="rId16"/>
   </p:sldIdLst>
   <p:sldSz cx="12192000" cy="6858000"/>
   <p:notesSz cx="6858000" cy="9144000"/>
@@ -3679,6 +3684,881 @@
             </a:pPr>
             <a:r>
               <a:rPr/>
+              <a:t>Example 1</a:t>
+            </a:r>
+          </a:p>
+        </p:txBody>
+      </p:sp>
+      <p:pic>
+        <p:nvPicPr>
+          <p:cNvPr descr="images/ED_FIG7.jpg" id="0" name="Picture 1"/>
+          <p:cNvPicPr>
+            <a:picLocks noGrp="1" noChangeAspect="1"/>
+          </p:cNvPicPr>
+          <p:nvPr/>
+        </p:nvPicPr>
+        <p:blipFill>
+          <a:blip r:embed="rId2"/>
+          <a:stretch>
+            <a:fillRect/>
+          </a:stretch>
+        </p:blipFill>
+        <p:spPr bwMode="auto">
+          <a:xfrm>
+            <a:off x="2540000" y="1816100"/>
+            <a:ext cx="7099300" cy="3835400"/>
+          </a:xfrm>
+          <a:prstGeom prst="rect">
+            <a:avLst/>
+          </a:prstGeom>
+          <a:noFill/>
+          <a:ln w="9525">
+            <a:noFill/>
+            <a:headEnd/>
+            <a:tailEnd/>
+          </a:ln>
+        </p:spPr>
+      </p:pic>
+      <p:sp>
+        <p:nvSpPr>
+          <p:cNvPr id="1" name="TextBox 3"/>
+          <p:cNvSpPr txBox="1"/>
+          <p:nvPr/>
+        </p:nvSpPr>
+        <p:spPr>
+          <a:xfrm>
+            <a:off x="838200" y="5651500"/>
+            <a:ext cx="10515600" cy="508000"/>
+          </a:xfrm>
+          <a:prstGeom prst="rect">
+            <a:avLst/>
+          </a:prstGeom>
+          <a:noFill/>
+        </p:spPr>
+        <p:txBody>
+          <a:bodyPr/>
+          <a:lstStyle/>
+          <a:p>
+            <a:pPr lvl="0" indent="0" marL="0" algn="ctr">
+              <a:buNone/>
+            </a:pPr>
+            <a:r>
+              <a:rPr/>
+              <a:t>Shen, et al. Nature Biomedical Engineering, 2024</a:t>
+            </a:r>
+          </a:p>
+        </p:txBody>
+      </p:sp>
+    </p:spTree>
+  </p:cSld>
+</p:sld>
+</file>
+
+<file path=ppt/slides/slide11.xml><?xml version="1.0" encoding="utf-8"?>
+<p:sld xmlns:a="http://schemas.openxmlformats.org/drawingml/2006/main" xmlns:r="http://schemas.openxmlformats.org/officeDocument/2006/relationships" xmlns:p="http://schemas.openxmlformats.org/presentationml/2006/main">
+  <p:cSld>
+    <p:spTree>
+      <p:nvGrpSpPr>
+        <p:cNvPr id="1" name=""/>
+        <p:cNvGrpSpPr/>
+        <p:nvPr/>
+      </p:nvGrpSpPr>
+      <p:grpSpPr>
+        <a:xfrm>
+          <a:off x="0" y="0"/>
+          <a:ext cx="0" cy="0"/>
+          <a:chOff x="0" y="0"/>
+          <a:chExt cx="0" cy="0"/>
+        </a:xfrm>
+      </p:grpSpPr>
+      <p:sp>
+        <p:nvSpPr>
+          <p:cNvPr id="2" name="Title 1">
+            <a:extLst>
+              <a:ext uri="{FF2B5EF4-FFF2-40B4-BE49-F238E27FC236}">
+                <a16:creationId xmlns:a16="http://schemas.microsoft.com/office/drawing/2014/main" id="{1F42567C-29A1-32BF-618A-40D311A39CF7}"/>
+              </a:ext>
+            </a:extLst>
+          </p:cNvPr>
+          <p:cNvSpPr>
+            <a:spLocks noGrp="1"/>
+          </p:cNvSpPr>
+          <p:nvPr>
+            <p:ph type="title"/>
+          </p:nvPr>
+        </p:nvSpPr>
+        <p:spPr>
+          <a:xfrm>
+            <a:off x="839788" y="457200"/>
+            <a:ext cx="3932237" cy="1600200"/>
+          </a:xfrm>
+        </p:spPr>
+        <p:txBody>
+          <a:bodyPr/>
+          <a:lstStyle/>
+          <a:p>
+            <a:pPr lvl="0" indent="0" marL="0">
+              <a:buNone/>
+            </a:pPr>
+            <a:r>
+              <a:rPr/>
+              <a:t>Example 1</a:t>
+            </a:r>
+          </a:p>
+        </p:txBody>
+      </p:sp>
+      <p:sp>
+        <p:nvSpPr>
+          <p:cNvPr id="4" name="Text Placeholder 3">
+            <a:extLst>
+              <a:ext uri="{FF2B5EF4-FFF2-40B4-BE49-F238E27FC236}">
+                <a16:creationId xmlns:a16="http://schemas.microsoft.com/office/drawing/2014/main" id="{E0D7D3B2-4149-01B8-85E5-1D320CACC8BE}"/>
+              </a:ext>
+            </a:extLst>
+          </p:cNvPr>
+          <p:cNvSpPr>
+            <a:spLocks noGrp="1"/>
+          </p:cNvSpPr>
+          <p:nvPr>
+            <p:ph idx="2" sz="half" type="body"/>
+          </p:nvPr>
+        </p:nvSpPr>
+        <p:spPr/>
+        <p:txBody>
+          <a:bodyPr/>
+          <a:lstStyle/>
+          <a:p>
+            <a:pPr lvl="0" indent="0" marL="0">
+              <a:spcBef>
+                <a:spcPts val="3000"/>
+              </a:spcBef>
+              <a:buNone/>
+            </a:pPr>
+            <a:r>
+              <a:rPr b="1"/>
+              <a:t>What’s the network?</a:t>
+            </a:r>
+          </a:p>
+          <a:p>
+            <a:pPr lvl="0" indent="0" marL="0">
+              <a:buNone/>
+            </a:pPr>
+            <a:r>
+              <a:rPr b="1"/>
+              <a:t>Nodes</a:t>
+            </a:r>
+            <a:r>
+              <a:rPr/>
+              <a:t>:</a:t>
+            </a:r>
+          </a:p>
+          <a:p>
+            <a:pPr lvl="0"/>
+            <a:r>
+              <a:rPr/>
+              <a:t>Wearable data: Step, HR, and CGM (continuous glucose monitoring) data</a:t>
+            </a:r>
+          </a:p>
+          <a:p>
+            <a:pPr lvl="0"/>
+            <a:r>
+              <a:rPr/>
+              <a:t>Omics data: Proteins, metabolites, and lipids</a:t>
+            </a:r>
+          </a:p>
+          <a:p>
+            <a:pPr lvl="0" indent="0" marL="0">
+              <a:buNone/>
+            </a:pPr>
+            <a:r>
+              <a:rPr b="1"/>
+              <a:t>Edges</a:t>
+            </a:r>
+            <a:r>
+              <a:rPr/>
+              <a:t>:</a:t>
+            </a:r>
+          </a:p>
+          <a:p>
+            <a:pPr lvl="0"/>
+            <a:r>
+              <a:rPr/>
+              <a:t>Lagged correlations</a:t>
+            </a:r>
+          </a:p>
+          <a:p>
+            <a:pPr lvl="0"/>
+            <a:r>
+              <a:rPr/>
+              <a:t>Blue: negative correlations</a:t>
+            </a:r>
+          </a:p>
+          <a:p>
+            <a:pPr lvl="0"/>
+            <a:r>
+              <a:rPr/>
+              <a:t>Red: positive correlations</a:t>
+            </a:r>
+          </a:p>
+        </p:txBody>
+      </p:sp>
+      <p:pic>
+        <p:nvPicPr>
+          <p:cNvPr descr="images/ED_FIG7.jpg" id="0" name="Picture 1"/>
+          <p:cNvPicPr>
+            <a:picLocks noGrp="1" noChangeAspect="1"/>
+          </p:cNvPicPr>
+          <p:nvPr/>
+        </p:nvPicPr>
+        <p:blipFill>
+          <a:blip r:embed="rId2"/>
+          <a:stretch>
+            <a:fillRect/>
+          </a:stretch>
+        </p:blipFill>
+        <p:spPr bwMode="auto">
+          <a:xfrm>
+            <a:off x="5181600" y="1485900"/>
+            <a:ext cx="6172200" cy="3327400"/>
+          </a:xfrm>
+          <a:prstGeom prst="rect">
+            <a:avLst/>
+          </a:prstGeom>
+          <a:noFill/>
+          <a:ln w="9525">
+            <a:noFill/>
+            <a:headEnd/>
+            <a:tailEnd/>
+          </a:ln>
+        </p:spPr>
+      </p:pic>
+      <p:sp>
+        <p:nvSpPr>
+          <p:cNvPr id="1" name="TextBox 3"/>
+          <p:cNvSpPr txBox="1"/>
+          <p:nvPr/>
+        </p:nvSpPr>
+        <p:spPr>
+          <a:xfrm>
+            <a:off x="5181600" y="5334000"/>
+            <a:ext cx="6172200" cy="508000"/>
+          </a:xfrm>
+          <a:prstGeom prst="rect">
+            <a:avLst/>
+          </a:prstGeom>
+          <a:noFill/>
+        </p:spPr>
+        <p:txBody>
+          <a:bodyPr/>
+          <a:lstStyle/>
+          <a:p>
+            <a:pPr lvl="0" indent="0" marL="0" algn="ctr">
+              <a:buNone/>
+            </a:pPr>
+            <a:r>
+              <a:rPr/>
+              <a:t>Shen, et al. Nature Biomedical Engineering, 2024</a:t>
+            </a:r>
+          </a:p>
+        </p:txBody>
+      </p:sp>
+    </p:spTree>
+  </p:cSld>
+</p:sld>
+</file>
+
+<file path=ppt/slides/slide12.xml><?xml version="1.0" encoding="utf-8"?>
+<p:sld xmlns:a="http://schemas.openxmlformats.org/drawingml/2006/main" xmlns:r="http://schemas.openxmlformats.org/officeDocument/2006/relationships" xmlns:p="http://schemas.openxmlformats.org/presentationml/2006/main">
+  <p:cSld>
+    <p:spTree>
+      <p:nvGrpSpPr>
+        <p:cNvPr id="1" name=""/>
+        <p:cNvGrpSpPr/>
+        <p:nvPr/>
+      </p:nvGrpSpPr>
+      <p:grpSpPr>
+        <a:xfrm>
+          <a:off x="0" y="0"/>
+          <a:ext cx="0" cy="0"/>
+          <a:chOff x="0" y="0"/>
+          <a:chExt cx="0" cy="0"/>
+        </a:xfrm>
+      </p:grpSpPr>
+      <p:sp>
+        <p:nvSpPr>
+          <p:cNvPr id="2" name="Title 1">
+            <a:extLst>
+              <a:ext uri="{FF2B5EF4-FFF2-40B4-BE49-F238E27FC236}">
+                <a16:creationId xmlns:a16="http://schemas.microsoft.com/office/drawing/2014/main" id="{FFEB6B4C-B951-9E3B-FF44-6DAFB89CD0CA}"/>
+              </a:ext>
+            </a:extLst>
+          </p:cNvPr>
+          <p:cNvSpPr>
+            <a:spLocks noGrp="1"/>
+          </p:cNvSpPr>
+          <p:nvPr>
+            <p:ph type="title"/>
+          </p:nvPr>
+        </p:nvSpPr>
+        <p:spPr/>
+        <p:txBody>
+          <a:bodyPr/>
+          <a:lstStyle/>
+          <a:p>
+            <a:pPr lvl="0" indent="0" marL="0">
+              <a:buNone/>
+            </a:pPr>
+            <a:r>
+              <a:rPr/>
+              <a:t>Read the data</a:t>
+            </a:r>
+          </a:p>
+        </p:txBody>
+      </p:sp>
+      <p:sp>
+        <p:nvSpPr>
+          <p:cNvPr id="3" name="Content Placeholder 2">
+            <a:extLst>
+              <a:ext uri="{FF2B5EF4-FFF2-40B4-BE49-F238E27FC236}">
+                <a16:creationId xmlns:a16="http://schemas.microsoft.com/office/drawing/2014/main" id="{0D2E4541-6F41-8935-01C0-F9C2ACB6400C}"/>
+              </a:ext>
+            </a:extLst>
+          </p:cNvPr>
+          <p:cNvSpPr>
+            <a:spLocks noGrp="1"/>
+          </p:cNvSpPr>
+          <p:nvPr>
+            <p:ph idx="1"/>
+          </p:nvPr>
+        </p:nvSpPr>
+        <p:spPr/>
+        <p:txBody>
+          <a:bodyPr/>
+          <a:lstStyle/>
+          <a:p>
+            <a:pPr lvl="0" indent="0">
+              <a:buNone/>
+            </a:pPr>
+            <a:r>
+              <a:rPr i="1">
+                <a:solidFill>
+                  <a:srgbClr val="5E5E5E"/>
+                </a:solidFill>
+                <a:latin typeface="Courier"/>
+              </a:rPr>
+              <a:t>## node data</a:t>
+            </a:r>
+            <a:br/>
+            <a:r>
+              <a:rPr b="1">
+                <a:solidFill>
+                  <a:srgbClr val="003B4F"/>
+                </a:solidFill>
+                <a:latin typeface="Courier"/>
+              </a:rPr>
+              <a:t>if</a:t>
+            </a:r>
+            <a:r>
+              <a:rPr>
+                <a:solidFill>
+                  <a:srgbClr val="003B4F"/>
+                </a:solidFill>
+                <a:latin typeface="Courier"/>
+              </a:rPr>
+              <a:t> (</a:t>
+            </a:r>
+            <a:r>
+              <a:rPr>
+                <a:solidFill>
+                  <a:srgbClr val="5E5E5E"/>
+                </a:solidFill>
+                <a:latin typeface="Courier"/>
+              </a:rPr>
+              <a:t>!</a:t>
+            </a:r>
+            <a:r>
+              <a:rPr>
+                <a:solidFill>
+                  <a:srgbClr val="4758AB"/>
+                </a:solidFill>
+                <a:latin typeface="Courier"/>
+              </a:rPr>
+              <a:t>require</a:t>
+            </a:r>
+            <a:r>
+              <a:rPr>
+                <a:solidFill>
+                  <a:srgbClr val="003B4F"/>
+                </a:solidFill>
+                <a:latin typeface="Courier"/>
+              </a:rPr>
+              <a:t>(readr)) {</a:t>
+            </a:r>
+            <a:br/>
+            <a:r>
+              <a:rPr>
+                <a:solidFill>
+                  <a:srgbClr val="003B4F"/>
+                </a:solidFill>
+                <a:latin typeface="Courier"/>
+              </a:rPr>
+              <a:t>  </a:t>
+            </a:r>
+            <a:r>
+              <a:rPr>
+                <a:solidFill>
+                  <a:srgbClr val="4758AB"/>
+                </a:solidFill>
+                <a:latin typeface="Courier"/>
+              </a:rPr>
+              <a:t>install.packages</a:t>
+            </a:r>
+            <a:r>
+              <a:rPr>
+                <a:solidFill>
+                  <a:srgbClr val="003B4F"/>
+                </a:solidFill>
+                <a:latin typeface="Courier"/>
+              </a:rPr>
+              <a:t>(</a:t>
+            </a:r>
+            <a:r>
+              <a:rPr>
+                <a:solidFill>
+                  <a:srgbClr val="20794D"/>
+                </a:solidFill>
+                <a:latin typeface="Courier"/>
+              </a:rPr>
+              <a:t>"readr"</a:t>
+            </a:r>
+            <a:r>
+              <a:rPr>
+                <a:solidFill>
+                  <a:srgbClr val="003B4F"/>
+                </a:solidFill>
+                <a:latin typeface="Courier"/>
+              </a:rPr>
+              <a:t>)</a:t>
+            </a:r>
+            <a:br/>
+            <a:r>
+              <a:rPr>
+                <a:solidFill>
+                  <a:srgbClr val="003B4F"/>
+                </a:solidFill>
+                <a:latin typeface="Courier"/>
+              </a:rPr>
+              <a:t>}</a:t>
+            </a:r>
+            <a:br/>
+            <a:r>
+              <a:rPr>
+                <a:solidFill>
+                  <a:srgbClr val="003B4F"/>
+                </a:solidFill>
+                <a:latin typeface="Courier"/>
+              </a:rPr>
+              <a:t>node_data &lt;-</a:t>
+            </a:r>
+            <a:br/>
+            <a:r>
+              <a:rPr>
+                <a:solidFill>
+                  <a:srgbClr val="003B4F"/>
+                </a:solidFill>
+                <a:latin typeface="Courier"/>
+              </a:rPr>
+              <a:t>  readr</a:t>
+            </a:r>
+            <a:r>
+              <a:rPr>
+                <a:solidFill>
+                  <a:srgbClr val="5E5E5E"/>
+                </a:solidFill>
+                <a:latin typeface="Courier"/>
+              </a:rPr>
+              <a:t>::</a:t>
+            </a:r>
+            <a:r>
+              <a:rPr>
+                <a:solidFill>
+                  <a:srgbClr val="4758AB"/>
+                </a:solidFill>
+                <a:latin typeface="Courier"/>
+              </a:rPr>
+              <a:t>read_csv</a:t>
+            </a:r>
+            <a:r>
+              <a:rPr>
+                <a:solidFill>
+                  <a:srgbClr val="003B4F"/>
+                </a:solidFill>
+                <a:latin typeface="Courier"/>
+              </a:rPr>
+              <a:t>(</a:t>
+            </a:r>
+            <a:br/>
+            <a:r>
+              <a:rPr>
+                <a:solidFill>
+                  <a:srgbClr val="003B4F"/>
+                </a:solidFill>
+                <a:latin typeface="Courier"/>
+              </a:rPr>
+              <a:t>    </a:t>
+            </a:r>
+            <a:r>
+              <a:rPr>
+                <a:solidFill>
+                  <a:srgbClr val="20794D"/>
+                </a:solidFill>
+                <a:latin typeface="Courier"/>
+              </a:rPr>
+              <a:t>"https://raw.githubusercontent.com/jaspershen-lab/MD7115-NTU/main/2_demo_data/example_node_data.csv"</a:t>
+            </a:r>
+            <a:br/>
+            <a:r>
+              <a:rPr>
+                <a:solidFill>
+                  <a:srgbClr val="003B4F"/>
+                </a:solidFill>
+                <a:latin typeface="Courier"/>
+              </a:rPr>
+              <a:t>  )</a:t>
+            </a:r>
+          </a:p>
+        </p:txBody>
+      </p:sp>
+    </p:spTree>
+  </p:cSld>
+</p:sld>
+</file>
+
+<file path=ppt/slides/slide13.xml><?xml version="1.0" encoding="utf-8"?>
+<p:sld xmlns:a="http://schemas.openxmlformats.org/drawingml/2006/main" xmlns:r="http://schemas.openxmlformats.org/officeDocument/2006/relationships" xmlns:p="http://schemas.openxmlformats.org/presentationml/2006/main">
+  <p:cSld>
+    <p:spTree>
+      <p:nvGrpSpPr>
+        <p:cNvPr id="1" name=""/>
+        <p:cNvGrpSpPr/>
+        <p:nvPr/>
+      </p:nvGrpSpPr>
+      <p:grpSpPr>
+        <a:xfrm>
+          <a:off x="0" y="0"/>
+          <a:ext cx="0" cy="0"/>
+          <a:chOff x="0" y="0"/>
+          <a:chExt cx="0" cy="0"/>
+        </a:xfrm>
+      </p:grpSpPr>
+      <p:sp>
+        <p:nvSpPr>
+          <p:cNvPr id="2" name="Title 1">
+            <a:extLst>
+              <a:ext uri="{FF2B5EF4-FFF2-40B4-BE49-F238E27FC236}">
+                <a16:creationId xmlns:a16="http://schemas.microsoft.com/office/drawing/2014/main" id="{FFEB6B4C-B951-9E3B-FF44-6DAFB89CD0CA}"/>
+              </a:ext>
+            </a:extLst>
+          </p:cNvPr>
+          <p:cNvSpPr>
+            <a:spLocks noGrp="1"/>
+          </p:cNvSpPr>
+          <p:nvPr>
+            <p:ph type="title"/>
+          </p:nvPr>
+        </p:nvSpPr>
+        <p:spPr/>
+        <p:txBody>
+          <a:bodyPr/>
+          <a:lstStyle/>
+          <a:p>
+            <a:pPr lvl="0" indent="0" marL="0">
+              <a:buNone/>
+            </a:pPr>
+            <a:r>
+              <a:rPr/>
+              <a:t>Read the data</a:t>
+            </a:r>
+          </a:p>
+        </p:txBody>
+      </p:sp>
+      <p:sp>
+        <p:nvSpPr>
+          <p:cNvPr id="3" name="Content Placeholder 2">
+            <a:extLst>
+              <a:ext uri="{FF2B5EF4-FFF2-40B4-BE49-F238E27FC236}">
+                <a16:creationId xmlns:a16="http://schemas.microsoft.com/office/drawing/2014/main" id="{0D2E4541-6F41-8935-01C0-F9C2ACB6400C}"/>
+              </a:ext>
+            </a:extLst>
+          </p:cNvPr>
+          <p:cNvSpPr>
+            <a:spLocks noGrp="1"/>
+          </p:cNvSpPr>
+          <p:nvPr>
+            <p:ph idx="1"/>
+          </p:nvPr>
+        </p:nvSpPr>
+        <p:spPr/>
+        <p:txBody>
+          <a:bodyPr/>
+          <a:lstStyle/>
+          <a:p>
+            <a:pPr lvl="0" indent="0">
+              <a:buNone/>
+            </a:pPr>
+            <a:r>
+              <a:rPr i="1">
+                <a:solidFill>
+                  <a:srgbClr val="5E5E5E"/>
+                </a:solidFill>
+                <a:latin typeface="Courier"/>
+              </a:rPr>
+              <a:t>##edge data</a:t>
+            </a:r>
+            <a:br/>
+            <a:r>
+              <a:rPr>
+                <a:solidFill>
+                  <a:srgbClr val="003B4F"/>
+                </a:solidFill>
+                <a:latin typeface="Courier"/>
+              </a:rPr>
+              <a:t>edge_data &lt;-</a:t>
+            </a:r>
+            <a:br/>
+            <a:r>
+              <a:rPr>
+                <a:solidFill>
+                  <a:srgbClr val="003B4F"/>
+                </a:solidFill>
+                <a:latin typeface="Courier"/>
+              </a:rPr>
+              <a:t>  readr</a:t>
+            </a:r>
+            <a:r>
+              <a:rPr>
+                <a:solidFill>
+                  <a:srgbClr val="5E5E5E"/>
+                </a:solidFill>
+                <a:latin typeface="Courier"/>
+              </a:rPr>
+              <a:t>::</a:t>
+            </a:r>
+            <a:r>
+              <a:rPr>
+                <a:solidFill>
+                  <a:srgbClr val="4758AB"/>
+                </a:solidFill>
+                <a:latin typeface="Courier"/>
+              </a:rPr>
+              <a:t>read_csv</a:t>
+            </a:r>
+            <a:r>
+              <a:rPr>
+                <a:solidFill>
+                  <a:srgbClr val="003B4F"/>
+                </a:solidFill>
+                <a:latin typeface="Courier"/>
+              </a:rPr>
+              <a:t>(</a:t>
+            </a:r>
+            <a:br/>
+            <a:r>
+              <a:rPr>
+                <a:solidFill>
+                  <a:srgbClr val="003B4F"/>
+                </a:solidFill>
+                <a:latin typeface="Courier"/>
+              </a:rPr>
+              <a:t>    </a:t>
+            </a:r>
+            <a:r>
+              <a:rPr>
+                <a:solidFill>
+                  <a:srgbClr val="20794D"/>
+                </a:solidFill>
+                <a:latin typeface="Courier"/>
+              </a:rPr>
+              <a:t>"https://raw.githubusercontent.com/jaspershen-lab/MD7115-NTU/main/2_demo_data/example_edge_data.csv"</a:t>
+            </a:r>
+            <a:br/>
+            <a:r>
+              <a:rPr>
+                <a:solidFill>
+                  <a:srgbClr val="003B4F"/>
+                </a:solidFill>
+                <a:latin typeface="Courier"/>
+              </a:rPr>
+              <a:t>  )</a:t>
+            </a:r>
+          </a:p>
+        </p:txBody>
+      </p:sp>
+    </p:spTree>
+  </p:cSld>
+</p:sld>
+</file>
+
+<file path=ppt/slides/slide14.xml><?xml version="1.0" encoding="utf-8"?>
+<p:sld xmlns:a="http://schemas.openxmlformats.org/drawingml/2006/main" xmlns:r="http://schemas.openxmlformats.org/officeDocument/2006/relationships" xmlns:p="http://schemas.openxmlformats.org/presentationml/2006/main">
+  <p:cSld>
+    <p:spTree>
+      <p:nvGrpSpPr>
+        <p:cNvPr id="1" name=""/>
+        <p:cNvGrpSpPr/>
+        <p:nvPr/>
+      </p:nvGrpSpPr>
+      <p:grpSpPr>
+        <a:xfrm>
+          <a:off x="0" y="0"/>
+          <a:ext cx="0" cy="0"/>
+          <a:chOff x="0" y="0"/>
+          <a:chExt cx="0" cy="0"/>
+        </a:xfrm>
+      </p:grpSpPr>
+      <p:sp>
+        <p:nvSpPr>
+          <p:cNvPr id="2" name="Title 1">
+            <a:extLst>
+              <a:ext uri="{FF2B5EF4-FFF2-40B4-BE49-F238E27FC236}">
+                <a16:creationId xmlns:a16="http://schemas.microsoft.com/office/drawing/2014/main" id="{FFEB6B4C-B951-9E3B-FF44-6DAFB89CD0CA}"/>
+              </a:ext>
+            </a:extLst>
+          </p:cNvPr>
+          <p:cNvSpPr>
+            <a:spLocks noGrp="1"/>
+          </p:cNvSpPr>
+          <p:nvPr>
+            <p:ph type="title"/>
+          </p:nvPr>
+        </p:nvSpPr>
+        <p:spPr/>
+        <p:txBody>
+          <a:bodyPr/>
+          <a:lstStyle/>
+          <a:p>
+            <a:pPr lvl="0" indent="0" marL="0">
+              <a:buNone/>
+            </a:pPr>
+            <a:r>
+              <a:rPr/>
+              <a:t>Node data</a:t>
+            </a:r>
+          </a:p>
+        </p:txBody>
+      </p:sp>
+      <p:sp>
+        <p:nvSpPr>
+          <p:cNvPr id="3" name="Content Placeholder 2">
+            <a:extLst>
+              <a:ext uri="{FF2B5EF4-FFF2-40B4-BE49-F238E27FC236}">
+                <a16:creationId xmlns:a16="http://schemas.microsoft.com/office/drawing/2014/main" id="{0D2E4541-6F41-8935-01C0-F9C2ACB6400C}"/>
+              </a:ext>
+            </a:extLst>
+          </p:cNvPr>
+          <p:cNvSpPr>
+            <a:spLocks noGrp="1"/>
+          </p:cNvSpPr>
+          <p:nvPr>
+            <p:ph idx="1"/>
+          </p:nvPr>
+        </p:nvSpPr>
+        <p:spPr/>
+        <p:txBody>
+          <a:bodyPr/>
+          <a:lstStyle/>
+          <a:p>
+            <a:pPr lvl="0" indent="0">
+              <a:buNone/>
+            </a:pPr>
+            <a:r>
+              <a:rPr>
+                <a:solidFill>
+                  <a:srgbClr val="4758AB"/>
+                </a:solidFill>
+                <a:latin typeface="Courier"/>
+              </a:rPr>
+              <a:t>head</a:t>
+            </a:r>
+            <a:r>
+              <a:rPr>
+                <a:solidFill>
+                  <a:srgbClr val="003B4F"/>
+                </a:solidFill>
+                <a:latin typeface="Courier"/>
+              </a:rPr>
+              <a:t>(node_data)</a:t>
+            </a:r>
+          </a:p>
+          <a:p>
+            <a:pPr lvl="0" indent="0">
+              <a:buNone/>
+            </a:pPr>
+            <a:r>
+              <a:rPr>
+                <a:latin typeface="Courier"/>
+              </a:rPr>
+              <a:t># A tibble: 6 × 4
+  node        class    mol_name class2        
+  &lt;chr&gt;       &lt;chr&gt;    &lt;chr&gt;    &lt;chr&gt;         
+1 CGM         cgm      CGM      wearable      
+2 cortisol_1  cortisol Cortisol internal-omics
+3 cytokine_34 cytokine IP10     internal-omics
+4 cytokine_40 cytokine TNFB     internal-omics
+5 cytokine_20 cytokine IL15     internal-omics
+6 cytokine_4  cytokine TGFA     internal-omics</a:t>
+            </a:r>
+          </a:p>
+        </p:txBody>
+      </p:sp>
+    </p:spTree>
+  </p:cSld>
+</p:sld>
+</file>
+
+<file path=ppt/slides/slide15.xml><?xml version="1.0" encoding="utf-8"?>
+<p:sld xmlns:a="http://schemas.openxmlformats.org/drawingml/2006/main" xmlns:r="http://schemas.openxmlformats.org/officeDocument/2006/relationships" xmlns:p="http://schemas.openxmlformats.org/presentationml/2006/main">
+  <p:cSld>
+    <p:spTree>
+      <p:nvGrpSpPr>
+        <p:cNvPr id="1" name=""/>
+        <p:cNvGrpSpPr/>
+        <p:nvPr/>
+      </p:nvGrpSpPr>
+      <p:grpSpPr>
+        <a:xfrm>
+          <a:off x="0" y="0"/>
+          <a:ext cx="0" cy="0"/>
+          <a:chOff x="0" y="0"/>
+          <a:chExt cx="0" cy="0"/>
+        </a:xfrm>
+      </p:grpSpPr>
+      <p:sp>
+        <p:nvSpPr>
+          <p:cNvPr id="2" name="Title 1">
+            <a:extLst>
+              <a:ext uri="{FF2B5EF4-FFF2-40B4-BE49-F238E27FC236}">
+                <a16:creationId xmlns:a16="http://schemas.microsoft.com/office/drawing/2014/main" id="{FFEB6B4C-B951-9E3B-FF44-6DAFB89CD0CA}"/>
+              </a:ext>
+            </a:extLst>
+          </p:cNvPr>
+          <p:cNvSpPr>
+            <a:spLocks noGrp="1"/>
+          </p:cNvSpPr>
+          <p:nvPr>
+            <p:ph type="title"/>
+          </p:nvPr>
+        </p:nvSpPr>
+        <p:spPr/>
+        <p:txBody>
+          <a:bodyPr/>
+          <a:lstStyle/>
+          <a:p>
+            <a:pPr lvl="0" indent="0" marL="0">
+              <a:buNone/>
+            </a:pPr>
+            <a:r>
+              <a:rPr/>
               <a:t>More references</a:t>
             </a:r>
           </a:p>
@@ -4110,7 +4990,7 @@
             <a:r>
               <a:rPr b="1">
                 <a:solidFill>
-                  <a:srgbClr val="007020"/>
+                  <a:srgbClr val="003B4F"/>
                 </a:solidFill>
                 <a:latin typeface="Courier"/>
               </a:rPr>
@@ -4118,6 +4998,9 @@
             </a:r>
             <a:r>
               <a:rPr>
+                <a:solidFill>
+                  <a:srgbClr val="003B4F"/>
+                </a:solidFill>
                 <a:latin typeface="Courier"/>
               </a:rPr>
               <a:t> (</a:t>
@@ -4125,7 +5008,7 @@
             <a:r>
               <a:rPr>
                 <a:solidFill>
-                  <a:srgbClr val="4070A0"/>
+                  <a:srgbClr val="5E5E5E"/>
                 </a:solidFill>
                 <a:latin typeface="Courier"/>
               </a:rPr>
@@ -4134,7 +5017,7 @@
             <a:r>
               <a:rPr>
                 <a:solidFill>
-                  <a:srgbClr val="06287E"/>
+                  <a:srgbClr val="4758AB"/>
                 </a:solidFill>
                 <a:latin typeface="Courier"/>
               </a:rPr>
@@ -4142,6 +5025,9 @@
             </a:r>
             <a:r>
               <a:rPr>
+                <a:solidFill>
+                  <a:srgbClr val="003B4F"/>
+                </a:solidFill>
                 <a:latin typeface="Courier"/>
               </a:rPr>
               <a:t>(</a:t>
@@ -4149,7 +5035,7 @@
             <a:r>
               <a:rPr>
                 <a:solidFill>
-                  <a:srgbClr val="4070A0"/>
+                  <a:srgbClr val="20794D"/>
                 </a:solidFill>
                 <a:latin typeface="Courier"/>
               </a:rPr>
@@ -4157,6 +5043,9 @@
             </a:r>
             <a:r>
               <a:rPr>
+                <a:solidFill>
+                  <a:srgbClr val="003B4F"/>
+                </a:solidFill>
                 <a:latin typeface="Courier"/>
               </a:rPr>
               <a:t>, </a:t>
@@ -4164,7 +5053,7 @@
             <a:r>
               <a:rPr>
                 <a:solidFill>
-                  <a:srgbClr val="7D9029"/>
+                  <a:srgbClr val="657422"/>
                 </a:solidFill>
                 <a:latin typeface="Courier"/>
               </a:rPr>
@@ -4172,6 +5061,9 @@
             </a:r>
             <a:r>
               <a:rPr>
+                <a:solidFill>
+                  <a:srgbClr val="003B4F"/>
+                </a:solidFill>
                 <a:latin typeface="Courier"/>
               </a:rPr>
               <a:t> </a:t>
@@ -4179,7 +5071,7 @@
             <a:r>
               <a:rPr>
                 <a:solidFill>
-                  <a:srgbClr val="880000"/>
+                  <a:srgbClr val="8F5902"/>
                 </a:solidFill>
                 <a:latin typeface="Courier"/>
               </a:rPr>
@@ -4187,6 +5079,9 @@
             </a:r>
             <a:r>
               <a:rPr>
+                <a:solidFill>
+                  <a:srgbClr val="003B4F"/>
+                </a:solidFill>
                 <a:latin typeface="Courier"/>
               </a:rPr>
               <a:t>)){</a:t>
@@ -4195,7 +5090,7 @@
             <a:r>
               <a:rPr>
                 <a:solidFill>
-                  <a:srgbClr val="06287E"/>
+                  <a:srgbClr val="4758AB"/>
                 </a:solidFill>
                 <a:latin typeface="Courier"/>
               </a:rPr>
@@ -4203,6 +5098,9 @@
             </a:r>
             <a:r>
               <a:rPr>
+                <a:solidFill>
+                  <a:srgbClr val="003B4F"/>
+                </a:solidFill>
                 <a:latin typeface="Courier"/>
               </a:rPr>
               <a:t>(</a:t>
@@ -4210,7 +5108,7 @@
             <a:r>
               <a:rPr>
                 <a:solidFill>
-                  <a:srgbClr val="4070A0"/>
+                  <a:srgbClr val="20794D"/>
                 </a:solidFill>
                 <a:latin typeface="Courier"/>
               </a:rPr>
@@ -4218,6 +5116,9 @@
             </a:r>
             <a:r>
               <a:rPr>
+                <a:solidFill>
+                  <a:srgbClr val="003B4F"/>
+                </a:solidFill>
                 <a:latin typeface="Courier"/>
               </a:rPr>
               <a:t>)</a:t>
@@ -4225,6 +5126,9 @@
             <a:br/>
             <a:r>
               <a:rPr>
+                <a:solidFill>
+                  <a:srgbClr val="003B4F"/>
+                </a:solidFill>
                 <a:latin typeface="Courier"/>
               </a:rPr>
               <a:t>}</a:t>
@@ -4337,7 +5241,7 @@
             <a:r>
               <a:rPr b="1">
                 <a:solidFill>
-                  <a:srgbClr val="007020"/>
+                  <a:srgbClr val="003B4F"/>
                 </a:solidFill>
                 <a:latin typeface="Courier"/>
               </a:rPr>
@@ -4345,6 +5249,9 @@
             </a:r>
             <a:r>
               <a:rPr>
+                <a:solidFill>
+                  <a:srgbClr val="003B4F"/>
+                </a:solidFill>
                 <a:latin typeface="Courier"/>
               </a:rPr>
               <a:t> (</a:t>
@@ -4352,7 +5259,7 @@
             <a:r>
               <a:rPr>
                 <a:solidFill>
-                  <a:srgbClr val="4070A0"/>
+                  <a:srgbClr val="5E5E5E"/>
                 </a:solidFill>
                 <a:latin typeface="Courier"/>
               </a:rPr>
@@ -4361,7 +5268,7 @@
             <a:r>
               <a:rPr>
                 <a:solidFill>
-                  <a:srgbClr val="06287E"/>
+                  <a:srgbClr val="4758AB"/>
                 </a:solidFill>
                 <a:latin typeface="Courier"/>
               </a:rPr>
@@ -4369,6 +5276,9 @@
             </a:r>
             <a:r>
               <a:rPr>
+                <a:solidFill>
+                  <a:srgbClr val="003B4F"/>
+                </a:solidFill>
                 <a:latin typeface="Courier"/>
               </a:rPr>
               <a:t>(</a:t>
@@ -4376,7 +5286,7 @@
             <a:r>
               <a:rPr>
                 <a:solidFill>
-                  <a:srgbClr val="4070A0"/>
+                  <a:srgbClr val="20794D"/>
                 </a:solidFill>
                 <a:latin typeface="Courier"/>
               </a:rPr>
@@ -4384,6 +5294,9 @@
             </a:r>
             <a:r>
               <a:rPr>
+                <a:solidFill>
+                  <a:srgbClr val="003B4F"/>
+                </a:solidFill>
                 <a:latin typeface="Courier"/>
               </a:rPr>
               <a:t>, </a:t>
@@ -4391,7 +5304,7 @@
             <a:r>
               <a:rPr>
                 <a:solidFill>
-                  <a:srgbClr val="7D9029"/>
+                  <a:srgbClr val="657422"/>
                 </a:solidFill>
                 <a:latin typeface="Courier"/>
               </a:rPr>
@@ -4399,6 +5312,9 @@
             </a:r>
             <a:r>
               <a:rPr>
+                <a:solidFill>
+                  <a:srgbClr val="003B4F"/>
+                </a:solidFill>
                 <a:latin typeface="Courier"/>
               </a:rPr>
               <a:t> </a:t>
@@ -4406,7 +5322,7 @@
             <a:r>
               <a:rPr>
                 <a:solidFill>
-                  <a:srgbClr val="880000"/>
+                  <a:srgbClr val="8F5902"/>
                 </a:solidFill>
                 <a:latin typeface="Courier"/>
               </a:rPr>
@@ -4414,6 +5330,9 @@
             </a:r>
             <a:r>
               <a:rPr>
+                <a:solidFill>
+                  <a:srgbClr val="003B4F"/>
+                </a:solidFill>
                 <a:latin typeface="Courier"/>
               </a:rPr>
               <a:t>)){</a:t>
@@ -4422,7 +5341,7 @@
             <a:r>
               <a:rPr>
                 <a:solidFill>
-                  <a:srgbClr val="06287E"/>
+                  <a:srgbClr val="4758AB"/>
                 </a:solidFill>
                 <a:latin typeface="Courier"/>
               </a:rPr>
@@ -4430,6 +5349,9 @@
             </a:r>
             <a:r>
               <a:rPr>
+                <a:solidFill>
+                  <a:srgbClr val="003B4F"/>
+                </a:solidFill>
                 <a:latin typeface="Courier"/>
               </a:rPr>
               <a:t>(</a:t>
@@ -4437,7 +5359,7 @@
             <a:r>
               <a:rPr>
                 <a:solidFill>
-                  <a:srgbClr val="4070A0"/>
+                  <a:srgbClr val="20794D"/>
                 </a:solidFill>
                 <a:latin typeface="Courier"/>
               </a:rPr>
@@ -4445,6 +5367,9 @@
             </a:r>
             <a:r>
               <a:rPr>
+                <a:solidFill>
+                  <a:srgbClr val="003B4F"/>
+                </a:solidFill>
                 <a:latin typeface="Courier"/>
               </a:rPr>
               <a:t>)</a:t>
@@ -4452,6 +5377,9 @@
             <a:br/>
             <a:r>
               <a:rPr>
+                <a:solidFill>
+                  <a:srgbClr val="003B4F"/>
+                </a:solidFill>
                 <a:latin typeface="Courier"/>
               </a:rPr>
               <a:t>}</a:t>
@@ -4546,9 +5474,109 @@
               <a:buNone/>
             </a:pPr>
             <a:r>
-              <a:rPr>
-                <a:solidFill>
-                  <a:srgbClr val="06287E"/>
+              <a:rPr b="1">
+                <a:solidFill>
+                  <a:srgbClr val="003B4F"/>
+                </a:solidFill>
+                <a:latin typeface="Courier"/>
+              </a:rPr>
+              <a:t>if</a:t>
+            </a:r>
+            <a:r>
+              <a:rPr>
+                <a:solidFill>
+                  <a:srgbClr val="003B4F"/>
+                </a:solidFill>
+                <a:latin typeface="Courier"/>
+              </a:rPr>
+              <a:t> (</a:t>
+            </a:r>
+            <a:r>
+              <a:rPr>
+                <a:solidFill>
+                  <a:srgbClr val="5E5E5E"/>
+                </a:solidFill>
+                <a:latin typeface="Courier"/>
+              </a:rPr>
+              <a:t>!</a:t>
+            </a:r>
+            <a:r>
+              <a:rPr>
+                <a:solidFill>
+                  <a:srgbClr val="4758AB"/>
+                </a:solidFill>
+                <a:latin typeface="Courier"/>
+              </a:rPr>
+              <a:t>requireNamespace</a:t>
+            </a:r>
+            <a:r>
+              <a:rPr>
+                <a:solidFill>
+                  <a:srgbClr val="003B4F"/>
+                </a:solidFill>
+                <a:latin typeface="Courier"/>
+              </a:rPr>
+              <a:t>(</a:t>
+            </a:r>
+            <a:r>
+              <a:rPr>
+                <a:solidFill>
+                  <a:srgbClr val="20794D"/>
+                </a:solidFill>
+                <a:latin typeface="Courier"/>
+              </a:rPr>
+              <a:t>"igraph"</a:t>
+            </a:r>
+            <a:r>
+              <a:rPr>
+                <a:solidFill>
+                  <a:srgbClr val="003B4F"/>
+                </a:solidFill>
+                <a:latin typeface="Courier"/>
+              </a:rPr>
+              <a:t>, </a:t>
+            </a:r>
+            <a:r>
+              <a:rPr>
+                <a:solidFill>
+                  <a:srgbClr val="657422"/>
+                </a:solidFill>
+                <a:latin typeface="Courier"/>
+              </a:rPr>
+              <a:t>quietly =</a:t>
+            </a:r>
+            <a:r>
+              <a:rPr>
+                <a:solidFill>
+                  <a:srgbClr val="003B4F"/>
+                </a:solidFill>
+                <a:latin typeface="Courier"/>
+              </a:rPr>
+              <a:t> </a:t>
+            </a:r>
+            <a:r>
+              <a:rPr>
+                <a:solidFill>
+                  <a:srgbClr val="8F5902"/>
+                </a:solidFill>
+                <a:latin typeface="Courier"/>
+              </a:rPr>
+              <a:t>TRUE</a:t>
+            </a:r>
+            <a:r>
+              <a:rPr>
+                <a:solidFill>
+                  <a:srgbClr val="003B4F"/>
+                </a:solidFill>
+                <a:latin typeface="Courier"/>
+              </a:rPr>
+              <a:t>)){</a:t>
+            </a:r>
+            <a:br/>
+            <a:r>
+              <a:rPr>
+                <a:solidFill>
+                  <a:srgbClr val="4758AB"/>
                 </a:solidFill>
                 <a:latin typeface="Courier"/>
               </a:rPr>
@@ -4556,6 +5584,9 @@
             </a:r>
             <a:r>
               <a:rPr>
+                <a:solidFill>
+                  <a:srgbClr val="003B4F"/>
+                </a:solidFill>
                 <a:latin typeface="Courier"/>
               </a:rPr>
               <a:t>(</a:t>
@@ -4563,7 +5594,7 @@
             <a:r>
               <a:rPr>
                 <a:solidFill>
-                  <a:srgbClr val="4070A0"/>
+                  <a:srgbClr val="20794D"/>
                 </a:solidFill>
                 <a:latin typeface="Courier"/>
               </a:rPr>
@@ -4571,6 +5602,9 @@
             </a:r>
             <a:r>
               <a:rPr>
+                <a:solidFill>
+                  <a:srgbClr val="003B4F"/>
+                </a:solidFill>
                 <a:latin typeface="Courier"/>
               </a:rPr>
               <a:t>)</a:t>
@@ -4579,7 +5613,117 @@
             <a:r>
               <a:rPr>
                 <a:solidFill>
-                  <a:srgbClr val="06287E"/>
+                  <a:srgbClr val="003B4F"/>
+                </a:solidFill>
+                <a:latin typeface="Courier"/>
+              </a:rPr>
+              <a:t>}</a:t>
+            </a:r>
+            <a:br/>
+            <a:r>
+              <a:rPr b="1">
+                <a:solidFill>
+                  <a:srgbClr val="003B4F"/>
+                </a:solidFill>
+                <a:latin typeface="Courier"/>
+              </a:rPr>
+              <a:t>if</a:t>
+            </a:r>
+            <a:r>
+              <a:rPr>
+                <a:solidFill>
+                  <a:srgbClr val="003B4F"/>
+                </a:solidFill>
+                <a:latin typeface="Courier"/>
+              </a:rPr>
+              <a:t>(</a:t>
+            </a:r>
+            <a:r>
+              <a:rPr>
+                <a:solidFill>
+                  <a:srgbClr val="5E5E5E"/>
+                </a:solidFill>
+                <a:latin typeface="Courier"/>
+              </a:rPr>
+              <a:t>!</a:t>
+            </a:r>
+            <a:r>
+              <a:rPr>
+                <a:solidFill>
+                  <a:srgbClr val="4758AB"/>
+                </a:solidFill>
+                <a:latin typeface="Courier"/>
+              </a:rPr>
+              <a:t>requireNamespace</a:t>
+            </a:r>
+            <a:r>
+              <a:rPr>
+                <a:solidFill>
+                  <a:srgbClr val="003B4F"/>
+                </a:solidFill>
+                <a:latin typeface="Courier"/>
+              </a:rPr>
+              <a:t>(</a:t>
+            </a:r>
+            <a:r>
+              <a:rPr>
+                <a:solidFill>
+                  <a:srgbClr val="20794D"/>
+                </a:solidFill>
+                <a:latin typeface="Courier"/>
+              </a:rPr>
+              <a:t>"ggraph"</a:t>
+            </a:r>
+            <a:r>
+              <a:rPr>
+                <a:solidFill>
+                  <a:srgbClr val="003B4F"/>
+                </a:solidFill>
+                <a:latin typeface="Courier"/>
+              </a:rPr>
+              <a:t>, </a:t>
+            </a:r>
+            <a:r>
+              <a:rPr>
+                <a:solidFill>
+                  <a:srgbClr val="657422"/>
+                </a:solidFill>
+                <a:latin typeface="Courier"/>
+              </a:rPr>
+              <a:t>quietly =</a:t>
+            </a:r>
+            <a:r>
+              <a:rPr>
+                <a:solidFill>
+                  <a:srgbClr val="003B4F"/>
+                </a:solidFill>
+                <a:latin typeface="Courier"/>
+              </a:rPr>
+              <a:t> </a:t>
+            </a:r>
+            <a:r>
+              <a:rPr>
+                <a:solidFill>
+                  <a:srgbClr val="8F5902"/>
+                </a:solidFill>
+                <a:latin typeface="Courier"/>
+              </a:rPr>
+              <a:t>TRUE</a:t>
+            </a:r>
+            <a:r>
+              <a:rPr>
+                <a:solidFill>
+                  <a:srgbClr val="003B4F"/>
+                </a:solidFill>
+                <a:latin typeface="Courier"/>
+              </a:rPr>
+              <a:t>)){</a:t>
+            </a:r>
+            <a:br/>
+            <a:r>
+              <a:rPr>
+                <a:solidFill>
+                  <a:srgbClr val="4758AB"/>
                 </a:solidFill>
                 <a:latin typeface="Courier"/>
               </a:rPr>
@@ -4587,6 +5731,9 @@
             </a:r>
             <a:r>
               <a:rPr>
+                <a:solidFill>
+                  <a:srgbClr val="003B4F"/>
+                </a:solidFill>
                 <a:latin typeface="Courier"/>
               </a:rPr>
               <a:t>(</a:t>
@@ -4594,7 +5741,7 @@
             <a:r>
               <a:rPr>
                 <a:solidFill>
-                  <a:srgbClr val="4070A0"/>
+                  <a:srgbClr val="20794D"/>
                 </a:solidFill>
                 <a:latin typeface="Courier"/>
               </a:rPr>
@@ -4602,6 +5749,9 @@
             </a:r>
             <a:r>
               <a:rPr>
+                <a:solidFill>
+                  <a:srgbClr val="003B4F"/>
+                </a:solidFill>
                 <a:latin typeface="Courier"/>
               </a:rPr>
               <a:t>)</a:t>
@@ -4610,201 +5760,11 @@
             <a:r>
               <a:rPr>
                 <a:solidFill>
-                  <a:srgbClr val="06287E"/>
-                </a:solidFill>
-                <a:latin typeface="Courier"/>
-              </a:rPr>
-              <a:t>install.packages</a:t>
-            </a:r>
-            <a:r>
-              <a:rPr>
-                <a:latin typeface="Courier"/>
-              </a:rPr>
-              <a:t>(</a:t>
-            </a:r>
-            <a:r>
-              <a:rPr>
-                <a:solidFill>
-                  <a:srgbClr val="4070A0"/>
-                </a:solidFill>
-                <a:latin typeface="Courier"/>
-              </a:rPr>
-              <a:t>"tidygraph"</a:t>
-            </a:r>
-            <a:r>
-              <a:rPr>
-                <a:latin typeface="Courier"/>
-              </a:rPr>
-              <a:t>)</a:t>
-            </a:r>
-            <a:br/>
-            <a:r>
-              <a:rPr>
-                <a:solidFill>
-                  <a:srgbClr val="06287E"/>
-                </a:solidFill>
-                <a:latin typeface="Courier"/>
-              </a:rPr>
-              <a:t>install.packages</a:t>
-            </a:r>
-            <a:r>
-              <a:rPr>
-                <a:latin typeface="Courier"/>
-              </a:rPr>
-              <a:t>(</a:t>
-            </a:r>
-            <a:r>
-              <a:rPr>
-                <a:solidFill>
-                  <a:srgbClr val="4070A0"/>
-                </a:solidFill>
-                <a:latin typeface="Courier"/>
-              </a:rPr>
-              <a:t>"ggnetwork"</a:t>
-            </a:r>
-            <a:r>
-              <a:rPr>
-                <a:latin typeface="Courier"/>
-              </a:rPr>
-              <a:t>)</a:t>
-            </a:r>
-            <a:br/>
-            <a:r>
-              <a:rPr>
-                <a:latin typeface="Courier"/>
-              </a:rPr>
-              <a:t>BiocManager</a:t>
-            </a:r>
-            <a:r>
-              <a:rPr>
-                <a:solidFill>
-                  <a:srgbClr val="4070A0"/>
-                </a:solidFill>
-                <a:latin typeface="Courier"/>
-              </a:rPr>
-              <a:t>::</a:t>
-            </a:r>
-            <a:r>
-              <a:rPr>
-                <a:solidFill>
-                  <a:srgbClr val="06287E"/>
-                </a:solidFill>
-                <a:latin typeface="Courier"/>
-              </a:rPr>
-              <a:t>install</a:t>
-            </a:r>
-            <a:r>
-              <a:rPr>
-                <a:latin typeface="Courier"/>
-              </a:rPr>
-              <a:t>(</a:t>
-            </a:r>
-            <a:r>
-              <a:rPr>
-                <a:solidFill>
-                  <a:srgbClr val="4070A0"/>
-                </a:solidFill>
-                <a:latin typeface="Courier"/>
-              </a:rPr>
-              <a:t>"ggtree"</a:t>
-            </a:r>
-            <a:r>
-              <a:rPr>
-                <a:latin typeface="Courier"/>
-              </a:rPr>
-              <a:t>)</a:t>
-            </a:r>
-            <a:br/>
-            <a:r>
-              <a:rPr>
-                <a:latin typeface="Courier"/>
-              </a:rPr>
-              <a:t>BiocManager</a:t>
-            </a:r>
-            <a:r>
-              <a:rPr>
-                <a:solidFill>
-                  <a:srgbClr val="4070A0"/>
-                </a:solidFill>
-                <a:latin typeface="Courier"/>
-              </a:rPr>
-              <a:t>::</a:t>
-            </a:r>
-            <a:r>
-              <a:rPr>
-                <a:solidFill>
-                  <a:srgbClr val="06287E"/>
-                </a:solidFill>
-                <a:latin typeface="Courier"/>
-              </a:rPr>
-              <a:t>install</a:t>
-            </a:r>
-            <a:r>
-              <a:rPr>
-                <a:latin typeface="Courier"/>
-              </a:rPr>
-              <a:t>(</a:t>
-            </a:r>
-            <a:r>
-              <a:rPr>
-                <a:solidFill>
-                  <a:srgbClr val="4070A0"/>
-                </a:solidFill>
-                <a:latin typeface="Courier"/>
-              </a:rPr>
-              <a:t>"treeio"</a:t>
-            </a:r>
-            <a:r>
-              <a:rPr>
-                <a:latin typeface="Courier"/>
-              </a:rPr>
-              <a:t>)</a:t>
-            </a:r>
-            <a:br/>
-            <a:r>
-              <a:rPr>
-                <a:latin typeface="Courier"/>
-              </a:rPr>
-              <a:t>BiocManager</a:t>
-            </a:r>
-            <a:r>
-              <a:rPr>
-                <a:solidFill>
-                  <a:srgbClr val="4070A0"/>
-                </a:solidFill>
-                <a:latin typeface="Courier"/>
-              </a:rPr>
-              <a:t>::</a:t>
-            </a:r>
-            <a:r>
-              <a:rPr>
-                <a:solidFill>
-                  <a:srgbClr val="06287E"/>
-                </a:solidFill>
-                <a:latin typeface="Courier"/>
-              </a:rPr>
-              <a:t>install</a:t>
-            </a:r>
-            <a:r>
-              <a:rPr>
-                <a:latin typeface="Courier"/>
-              </a:rPr>
-              <a:t>(</a:t>
-            </a:r>
-            <a:r>
-              <a:rPr>
-                <a:solidFill>
-                  <a:srgbClr val="4070A0"/>
-                </a:solidFill>
-                <a:latin typeface="Courier"/>
-              </a:rPr>
-              <a:t>"ggtreeExtra"</a:t>
-            </a:r>
-            <a:r>
-              <a:rPr>
-                <a:latin typeface="Courier"/>
-              </a:rPr>
-              <a:t>)</a:t>
+                  <a:srgbClr val="003B4F"/>
+                </a:solidFill>
+                <a:latin typeface="Courier"/>
+              </a:rPr>
+              <a:t>}</a:t>
             </a:r>
           </a:p>
         </p:txBody>
@@ -4815,6 +5775,971 @@
 </file>
 
 <file path=ppt/slides/slide7.xml><?xml version="1.0" encoding="utf-8"?>
+<p:sld xmlns:a="http://schemas.openxmlformats.org/drawingml/2006/main" xmlns:r="http://schemas.openxmlformats.org/officeDocument/2006/relationships" xmlns:p="http://schemas.openxmlformats.org/presentationml/2006/main">
+  <p:cSld>
+    <p:spTree>
+      <p:nvGrpSpPr>
+        <p:cNvPr id="1" name=""/>
+        <p:cNvGrpSpPr/>
+        <p:nvPr/>
+      </p:nvGrpSpPr>
+      <p:grpSpPr>
+        <a:xfrm>
+          <a:off x="0" y="0"/>
+          <a:ext cx="0" cy="0"/>
+          <a:chOff x="0" y="0"/>
+          <a:chExt cx="0" cy="0"/>
+        </a:xfrm>
+      </p:grpSpPr>
+      <p:sp>
+        <p:nvSpPr>
+          <p:cNvPr id="2" name="Title 1">
+            <a:extLst>
+              <a:ext uri="{FF2B5EF4-FFF2-40B4-BE49-F238E27FC236}">
+                <a16:creationId xmlns:a16="http://schemas.microsoft.com/office/drawing/2014/main" id="{FFEB6B4C-B951-9E3B-FF44-6DAFB89CD0CA}"/>
+              </a:ext>
+            </a:extLst>
+          </p:cNvPr>
+          <p:cNvSpPr>
+            <a:spLocks noGrp="1"/>
+          </p:cNvSpPr>
+          <p:nvPr>
+            <p:ph type="title"/>
+          </p:nvPr>
+        </p:nvSpPr>
+        <p:spPr/>
+        <p:txBody>
+          <a:bodyPr/>
+          <a:lstStyle/>
+          <a:p>
+            <a:pPr lvl="0" indent="0" marL="0">
+              <a:buNone/>
+            </a:pPr>
+            <a:r>
+              <a:rPr/>
+              <a:t>Preparation</a:t>
+            </a:r>
+          </a:p>
+        </p:txBody>
+      </p:sp>
+      <p:sp>
+        <p:nvSpPr>
+          <p:cNvPr id="3" name="Content Placeholder 2">
+            <a:extLst>
+              <a:ext uri="{FF2B5EF4-FFF2-40B4-BE49-F238E27FC236}">
+                <a16:creationId xmlns:a16="http://schemas.microsoft.com/office/drawing/2014/main" id="{0D2E4541-6F41-8935-01C0-F9C2ACB6400C}"/>
+              </a:ext>
+            </a:extLst>
+          </p:cNvPr>
+          <p:cNvSpPr>
+            <a:spLocks noGrp="1"/>
+          </p:cNvSpPr>
+          <p:nvPr>
+            <p:ph idx="1"/>
+          </p:nvPr>
+        </p:nvSpPr>
+        <p:spPr/>
+        <p:txBody>
+          <a:bodyPr/>
+          <a:lstStyle/>
+          <a:p>
+            <a:pPr lvl="0" indent="0" marL="0">
+              <a:buNone/>
+            </a:pPr>
+            <a:r>
+              <a:rPr/>
+              <a:t>Some specific packages for graph, network and tree analysis.</a:t>
+            </a:r>
+          </a:p>
+          <a:p>
+            <a:pPr lvl="0" indent="0">
+              <a:buNone/>
+            </a:pPr>
+            <a:r>
+              <a:rPr b="1">
+                <a:solidFill>
+                  <a:srgbClr val="003B4F"/>
+                </a:solidFill>
+                <a:latin typeface="Courier"/>
+              </a:rPr>
+              <a:t>if</a:t>
+            </a:r>
+            <a:r>
+              <a:rPr>
+                <a:solidFill>
+                  <a:srgbClr val="003B4F"/>
+                </a:solidFill>
+                <a:latin typeface="Courier"/>
+              </a:rPr>
+              <a:t>(</a:t>
+            </a:r>
+            <a:r>
+              <a:rPr>
+                <a:solidFill>
+                  <a:srgbClr val="5E5E5E"/>
+                </a:solidFill>
+                <a:latin typeface="Courier"/>
+              </a:rPr>
+              <a:t>!</a:t>
+            </a:r>
+            <a:r>
+              <a:rPr>
+                <a:solidFill>
+                  <a:srgbClr val="4758AB"/>
+                </a:solidFill>
+                <a:latin typeface="Courier"/>
+              </a:rPr>
+              <a:t>requireNamespace</a:t>
+            </a:r>
+            <a:r>
+              <a:rPr>
+                <a:solidFill>
+                  <a:srgbClr val="003B4F"/>
+                </a:solidFill>
+                <a:latin typeface="Courier"/>
+              </a:rPr>
+              <a:t>(</a:t>
+            </a:r>
+            <a:r>
+              <a:rPr>
+                <a:solidFill>
+                  <a:srgbClr val="20794D"/>
+                </a:solidFill>
+                <a:latin typeface="Courier"/>
+              </a:rPr>
+              <a:t>"tidygraph"</a:t>
+            </a:r>
+            <a:r>
+              <a:rPr>
+                <a:solidFill>
+                  <a:srgbClr val="003B4F"/>
+                </a:solidFill>
+                <a:latin typeface="Courier"/>
+              </a:rPr>
+              <a:t>, </a:t>
+            </a:r>
+            <a:r>
+              <a:rPr>
+                <a:solidFill>
+                  <a:srgbClr val="657422"/>
+                </a:solidFill>
+                <a:latin typeface="Courier"/>
+              </a:rPr>
+              <a:t>quietly =</a:t>
+            </a:r>
+            <a:r>
+              <a:rPr>
+                <a:solidFill>
+                  <a:srgbClr val="003B4F"/>
+                </a:solidFill>
+                <a:latin typeface="Courier"/>
+              </a:rPr>
+              <a:t> </a:t>
+            </a:r>
+            <a:r>
+              <a:rPr>
+                <a:solidFill>
+                  <a:srgbClr val="8F5902"/>
+                </a:solidFill>
+                <a:latin typeface="Courier"/>
+              </a:rPr>
+              <a:t>TRUE</a:t>
+            </a:r>
+            <a:r>
+              <a:rPr>
+                <a:solidFill>
+                  <a:srgbClr val="003B4F"/>
+                </a:solidFill>
+                <a:latin typeface="Courier"/>
+              </a:rPr>
+              <a:t>)){</a:t>
+            </a:r>
+            <a:br/>
+            <a:r>
+              <a:rPr>
+                <a:solidFill>
+                  <a:srgbClr val="4758AB"/>
+                </a:solidFill>
+                <a:latin typeface="Courier"/>
+              </a:rPr>
+              <a:t>install.packages</a:t>
+            </a:r>
+            <a:r>
+              <a:rPr>
+                <a:solidFill>
+                  <a:srgbClr val="003B4F"/>
+                </a:solidFill>
+                <a:latin typeface="Courier"/>
+              </a:rPr>
+              <a:t>(</a:t>
+            </a:r>
+            <a:r>
+              <a:rPr>
+                <a:solidFill>
+                  <a:srgbClr val="20794D"/>
+                </a:solidFill>
+                <a:latin typeface="Courier"/>
+              </a:rPr>
+              <a:t>"tidygraph"</a:t>
+            </a:r>
+            <a:r>
+              <a:rPr>
+                <a:solidFill>
+                  <a:srgbClr val="003B4F"/>
+                </a:solidFill>
+                <a:latin typeface="Courier"/>
+              </a:rPr>
+              <a:t>)</a:t>
+            </a:r>
+            <a:br/>
+            <a:r>
+              <a:rPr>
+                <a:solidFill>
+                  <a:srgbClr val="003B4F"/>
+                </a:solidFill>
+                <a:latin typeface="Courier"/>
+              </a:rPr>
+              <a:t>}</a:t>
+            </a:r>
+            <a:br/>
+            <a:r>
+              <a:rPr b="1">
+                <a:solidFill>
+                  <a:srgbClr val="003B4F"/>
+                </a:solidFill>
+                <a:latin typeface="Courier"/>
+              </a:rPr>
+              <a:t>if</a:t>
+            </a:r>
+            <a:r>
+              <a:rPr>
+                <a:solidFill>
+                  <a:srgbClr val="003B4F"/>
+                </a:solidFill>
+                <a:latin typeface="Courier"/>
+              </a:rPr>
+              <a:t>(</a:t>
+            </a:r>
+            <a:r>
+              <a:rPr>
+                <a:solidFill>
+                  <a:srgbClr val="5E5E5E"/>
+                </a:solidFill>
+                <a:latin typeface="Courier"/>
+              </a:rPr>
+              <a:t>!</a:t>
+            </a:r>
+            <a:r>
+              <a:rPr>
+                <a:solidFill>
+                  <a:srgbClr val="4758AB"/>
+                </a:solidFill>
+                <a:latin typeface="Courier"/>
+              </a:rPr>
+              <a:t>requireNamespace</a:t>
+            </a:r>
+            <a:r>
+              <a:rPr>
+                <a:solidFill>
+                  <a:srgbClr val="003B4F"/>
+                </a:solidFill>
+                <a:latin typeface="Courier"/>
+              </a:rPr>
+              <a:t>(</a:t>
+            </a:r>
+            <a:r>
+              <a:rPr>
+                <a:solidFill>
+                  <a:srgbClr val="20794D"/>
+                </a:solidFill>
+                <a:latin typeface="Courier"/>
+              </a:rPr>
+              <a:t>"ggnetwork"</a:t>
+            </a:r>
+            <a:r>
+              <a:rPr>
+                <a:solidFill>
+                  <a:srgbClr val="003B4F"/>
+                </a:solidFill>
+                <a:latin typeface="Courier"/>
+              </a:rPr>
+              <a:t>, </a:t>
+            </a:r>
+            <a:r>
+              <a:rPr>
+                <a:solidFill>
+                  <a:srgbClr val="657422"/>
+                </a:solidFill>
+                <a:latin typeface="Courier"/>
+              </a:rPr>
+              <a:t>quietly =</a:t>
+            </a:r>
+            <a:r>
+              <a:rPr>
+                <a:solidFill>
+                  <a:srgbClr val="003B4F"/>
+                </a:solidFill>
+                <a:latin typeface="Courier"/>
+              </a:rPr>
+              <a:t> </a:t>
+            </a:r>
+            <a:r>
+              <a:rPr>
+                <a:solidFill>
+                  <a:srgbClr val="8F5902"/>
+                </a:solidFill>
+                <a:latin typeface="Courier"/>
+              </a:rPr>
+              <a:t>TRUE</a:t>
+            </a:r>
+            <a:r>
+              <a:rPr>
+                <a:solidFill>
+                  <a:srgbClr val="003B4F"/>
+                </a:solidFill>
+                <a:latin typeface="Courier"/>
+              </a:rPr>
+              <a:t>)){</a:t>
+            </a:r>
+            <a:br/>
+            <a:r>
+              <a:rPr>
+                <a:solidFill>
+                  <a:srgbClr val="4758AB"/>
+                </a:solidFill>
+                <a:latin typeface="Courier"/>
+              </a:rPr>
+              <a:t>install.packages</a:t>
+            </a:r>
+            <a:r>
+              <a:rPr>
+                <a:solidFill>
+                  <a:srgbClr val="003B4F"/>
+                </a:solidFill>
+                <a:latin typeface="Courier"/>
+              </a:rPr>
+              <a:t>(</a:t>
+            </a:r>
+            <a:r>
+              <a:rPr>
+                <a:solidFill>
+                  <a:srgbClr val="20794D"/>
+                </a:solidFill>
+                <a:latin typeface="Courier"/>
+              </a:rPr>
+              <a:t>"ggnetwork"</a:t>
+            </a:r>
+            <a:r>
+              <a:rPr>
+                <a:solidFill>
+                  <a:srgbClr val="003B4F"/>
+                </a:solidFill>
+                <a:latin typeface="Courier"/>
+              </a:rPr>
+              <a:t>)</a:t>
+            </a:r>
+            <a:br/>
+            <a:r>
+              <a:rPr>
+                <a:solidFill>
+                  <a:srgbClr val="003B4F"/>
+                </a:solidFill>
+                <a:latin typeface="Courier"/>
+              </a:rPr>
+              <a:t>}</a:t>
+            </a:r>
+          </a:p>
+        </p:txBody>
+      </p:sp>
+    </p:spTree>
+  </p:cSld>
+</p:sld>
+</file>
+
+<file path=ppt/slides/slide8.xml><?xml version="1.0" encoding="utf-8"?>
+<p:sld xmlns:a="http://schemas.openxmlformats.org/drawingml/2006/main" xmlns:r="http://schemas.openxmlformats.org/officeDocument/2006/relationships" xmlns:p="http://schemas.openxmlformats.org/presentationml/2006/main">
+  <p:cSld>
+    <p:spTree>
+      <p:nvGrpSpPr>
+        <p:cNvPr id="1" name=""/>
+        <p:cNvGrpSpPr/>
+        <p:nvPr/>
+      </p:nvGrpSpPr>
+      <p:grpSpPr>
+        <a:xfrm>
+          <a:off x="0" y="0"/>
+          <a:ext cx="0" cy="0"/>
+          <a:chOff x="0" y="0"/>
+          <a:chExt cx="0" cy="0"/>
+        </a:xfrm>
+      </p:grpSpPr>
+      <p:sp>
+        <p:nvSpPr>
+          <p:cNvPr id="2" name="Title 1">
+            <a:extLst>
+              <a:ext uri="{FF2B5EF4-FFF2-40B4-BE49-F238E27FC236}">
+                <a16:creationId xmlns:a16="http://schemas.microsoft.com/office/drawing/2014/main" id="{FFEB6B4C-B951-9E3B-FF44-6DAFB89CD0CA}"/>
+              </a:ext>
+            </a:extLst>
+          </p:cNvPr>
+          <p:cNvSpPr>
+            <a:spLocks noGrp="1"/>
+          </p:cNvSpPr>
+          <p:nvPr>
+            <p:ph type="title"/>
+          </p:nvPr>
+        </p:nvSpPr>
+        <p:spPr/>
+        <p:txBody>
+          <a:bodyPr/>
+          <a:lstStyle/>
+          <a:p>
+            <a:pPr lvl="0" indent="0" marL="0">
+              <a:buNone/>
+            </a:pPr>
+            <a:r>
+              <a:rPr/>
+              <a:t>Preparation</a:t>
+            </a:r>
+          </a:p>
+        </p:txBody>
+      </p:sp>
+      <p:sp>
+        <p:nvSpPr>
+          <p:cNvPr id="3" name="Content Placeholder 2">
+            <a:extLst>
+              <a:ext uri="{FF2B5EF4-FFF2-40B4-BE49-F238E27FC236}">
+                <a16:creationId xmlns:a16="http://schemas.microsoft.com/office/drawing/2014/main" id="{0D2E4541-6F41-8935-01C0-F9C2ACB6400C}"/>
+              </a:ext>
+            </a:extLst>
+          </p:cNvPr>
+          <p:cNvSpPr>
+            <a:spLocks noGrp="1"/>
+          </p:cNvSpPr>
+          <p:nvPr>
+            <p:ph idx="1"/>
+          </p:nvPr>
+        </p:nvSpPr>
+        <p:spPr/>
+        <p:txBody>
+          <a:bodyPr/>
+          <a:lstStyle/>
+          <a:p>
+            <a:pPr lvl="0" indent="0" marL="0">
+              <a:buNone/>
+            </a:pPr>
+            <a:r>
+              <a:rPr/>
+              <a:t>Some specific packages for graph, network and tree analysis.</a:t>
+            </a:r>
+          </a:p>
+          <a:p>
+            <a:pPr lvl="0" indent="0">
+              <a:buNone/>
+            </a:pPr>
+            <a:r>
+              <a:rPr b="1">
+                <a:solidFill>
+                  <a:srgbClr val="003B4F"/>
+                </a:solidFill>
+                <a:latin typeface="Courier"/>
+              </a:rPr>
+              <a:t>if</a:t>
+            </a:r>
+            <a:r>
+              <a:rPr>
+                <a:solidFill>
+                  <a:srgbClr val="003B4F"/>
+                </a:solidFill>
+                <a:latin typeface="Courier"/>
+              </a:rPr>
+              <a:t>(</a:t>
+            </a:r>
+            <a:r>
+              <a:rPr>
+                <a:solidFill>
+                  <a:srgbClr val="5E5E5E"/>
+                </a:solidFill>
+                <a:latin typeface="Courier"/>
+              </a:rPr>
+              <a:t>!</a:t>
+            </a:r>
+            <a:r>
+              <a:rPr>
+                <a:solidFill>
+                  <a:srgbClr val="4758AB"/>
+                </a:solidFill>
+                <a:latin typeface="Courier"/>
+              </a:rPr>
+              <a:t>requireNamespace</a:t>
+            </a:r>
+            <a:r>
+              <a:rPr>
+                <a:solidFill>
+                  <a:srgbClr val="003B4F"/>
+                </a:solidFill>
+                <a:latin typeface="Courier"/>
+              </a:rPr>
+              <a:t>(</a:t>
+            </a:r>
+            <a:r>
+              <a:rPr>
+                <a:solidFill>
+                  <a:srgbClr val="20794D"/>
+                </a:solidFill>
+                <a:latin typeface="Courier"/>
+              </a:rPr>
+              <a:t>"ggtree"</a:t>
+            </a:r>
+            <a:r>
+              <a:rPr>
+                <a:solidFill>
+                  <a:srgbClr val="003B4F"/>
+                </a:solidFill>
+                <a:latin typeface="Courier"/>
+              </a:rPr>
+              <a:t>, </a:t>
+            </a:r>
+            <a:r>
+              <a:rPr>
+                <a:solidFill>
+                  <a:srgbClr val="657422"/>
+                </a:solidFill>
+                <a:latin typeface="Courier"/>
+              </a:rPr>
+              <a:t>quietly =</a:t>
+            </a:r>
+            <a:r>
+              <a:rPr>
+                <a:solidFill>
+                  <a:srgbClr val="003B4F"/>
+                </a:solidFill>
+                <a:latin typeface="Courier"/>
+              </a:rPr>
+              <a:t> </a:t>
+            </a:r>
+            <a:r>
+              <a:rPr>
+                <a:solidFill>
+                  <a:srgbClr val="8F5902"/>
+                </a:solidFill>
+                <a:latin typeface="Courier"/>
+              </a:rPr>
+              <a:t>TRUE</a:t>
+            </a:r>
+            <a:r>
+              <a:rPr>
+                <a:solidFill>
+                  <a:srgbClr val="003B4F"/>
+                </a:solidFill>
+                <a:latin typeface="Courier"/>
+              </a:rPr>
+              <a:t>)){</a:t>
+            </a:r>
+            <a:br/>
+            <a:r>
+              <a:rPr>
+                <a:solidFill>
+                  <a:srgbClr val="003B4F"/>
+                </a:solidFill>
+                <a:latin typeface="Courier"/>
+              </a:rPr>
+              <a:t>BiocManager</a:t>
+            </a:r>
+            <a:r>
+              <a:rPr>
+                <a:solidFill>
+                  <a:srgbClr val="5E5E5E"/>
+                </a:solidFill>
+                <a:latin typeface="Courier"/>
+              </a:rPr>
+              <a:t>::</a:t>
+            </a:r>
+            <a:r>
+              <a:rPr>
+                <a:solidFill>
+                  <a:srgbClr val="4758AB"/>
+                </a:solidFill>
+                <a:latin typeface="Courier"/>
+              </a:rPr>
+              <a:t>install</a:t>
+            </a:r>
+            <a:r>
+              <a:rPr>
+                <a:solidFill>
+                  <a:srgbClr val="003B4F"/>
+                </a:solidFill>
+                <a:latin typeface="Courier"/>
+              </a:rPr>
+              <a:t>(</a:t>
+            </a:r>
+            <a:r>
+              <a:rPr>
+                <a:solidFill>
+                  <a:srgbClr val="20794D"/>
+                </a:solidFill>
+                <a:latin typeface="Courier"/>
+              </a:rPr>
+              <a:t>"ggtree"</a:t>
+            </a:r>
+            <a:r>
+              <a:rPr>
+                <a:solidFill>
+                  <a:srgbClr val="003B4F"/>
+                </a:solidFill>
+                <a:latin typeface="Courier"/>
+              </a:rPr>
+              <a:t>)  </a:t>
+            </a:r>
+            <a:br/>
+            <a:r>
+              <a:rPr>
+                <a:solidFill>
+                  <a:srgbClr val="003B4F"/>
+                </a:solidFill>
+                <a:latin typeface="Courier"/>
+              </a:rPr>
+              <a:t>}</a:t>
+            </a:r>
+            <a:br/>
+            <a:r>
+              <a:rPr b="1">
+                <a:solidFill>
+                  <a:srgbClr val="003B4F"/>
+                </a:solidFill>
+                <a:latin typeface="Courier"/>
+              </a:rPr>
+              <a:t>if</a:t>
+            </a:r>
+            <a:r>
+              <a:rPr>
+                <a:solidFill>
+                  <a:srgbClr val="003B4F"/>
+                </a:solidFill>
+                <a:latin typeface="Courier"/>
+              </a:rPr>
+              <a:t>(</a:t>
+            </a:r>
+            <a:r>
+              <a:rPr>
+                <a:solidFill>
+                  <a:srgbClr val="5E5E5E"/>
+                </a:solidFill>
+                <a:latin typeface="Courier"/>
+              </a:rPr>
+              <a:t>!</a:t>
+            </a:r>
+            <a:r>
+              <a:rPr>
+                <a:solidFill>
+                  <a:srgbClr val="4758AB"/>
+                </a:solidFill>
+                <a:latin typeface="Courier"/>
+              </a:rPr>
+              <a:t>requireNamespace</a:t>
+            </a:r>
+            <a:r>
+              <a:rPr>
+                <a:solidFill>
+                  <a:srgbClr val="003B4F"/>
+                </a:solidFill>
+                <a:latin typeface="Courier"/>
+              </a:rPr>
+              <a:t>(</a:t>
+            </a:r>
+            <a:r>
+              <a:rPr>
+                <a:solidFill>
+                  <a:srgbClr val="20794D"/>
+                </a:solidFill>
+                <a:latin typeface="Courier"/>
+              </a:rPr>
+              <a:t>"treeio"</a:t>
+            </a:r>
+            <a:r>
+              <a:rPr>
+                <a:solidFill>
+                  <a:srgbClr val="003B4F"/>
+                </a:solidFill>
+                <a:latin typeface="Courier"/>
+              </a:rPr>
+              <a:t>, </a:t>
+            </a:r>
+            <a:r>
+              <a:rPr>
+                <a:solidFill>
+                  <a:srgbClr val="657422"/>
+                </a:solidFill>
+                <a:latin typeface="Courier"/>
+              </a:rPr>
+              <a:t>quietly =</a:t>
+            </a:r>
+            <a:r>
+              <a:rPr>
+                <a:solidFill>
+                  <a:srgbClr val="003B4F"/>
+                </a:solidFill>
+                <a:latin typeface="Courier"/>
+              </a:rPr>
+              <a:t> </a:t>
+            </a:r>
+            <a:r>
+              <a:rPr>
+                <a:solidFill>
+                  <a:srgbClr val="8F5902"/>
+                </a:solidFill>
+                <a:latin typeface="Courier"/>
+              </a:rPr>
+              <a:t>TRUE</a:t>
+            </a:r>
+            <a:r>
+              <a:rPr>
+                <a:solidFill>
+                  <a:srgbClr val="003B4F"/>
+                </a:solidFill>
+                <a:latin typeface="Courier"/>
+              </a:rPr>
+              <a:t>)){</a:t>
+            </a:r>
+            <a:br/>
+            <a:r>
+              <a:rPr>
+                <a:solidFill>
+                  <a:srgbClr val="003B4F"/>
+                </a:solidFill>
+                <a:latin typeface="Courier"/>
+              </a:rPr>
+              <a:t>BiocManager</a:t>
+            </a:r>
+            <a:r>
+              <a:rPr>
+                <a:solidFill>
+                  <a:srgbClr val="5E5E5E"/>
+                </a:solidFill>
+                <a:latin typeface="Courier"/>
+              </a:rPr>
+              <a:t>::</a:t>
+            </a:r>
+            <a:r>
+              <a:rPr>
+                <a:solidFill>
+                  <a:srgbClr val="4758AB"/>
+                </a:solidFill>
+                <a:latin typeface="Courier"/>
+              </a:rPr>
+              <a:t>install</a:t>
+            </a:r>
+            <a:r>
+              <a:rPr>
+                <a:solidFill>
+                  <a:srgbClr val="003B4F"/>
+                </a:solidFill>
+                <a:latin typeface="Courier"/>
+              </a:rPr>
+              <a:t>(</a:t>
+            </a:r>
+            <a:r>
+              <a:rPr>
+                <a:solidFill>
+                  <a:srgbClr val="20794D"/>
+                </a:solidFill>
+                <a:latin typeface="Courier"/>
+              </a:rPr>
+              <a:t>"treeio"</a:t>
+            </a:r>
+            <a:r>
+              <a:rPr>
+                <a:solidFill>
+                  <a:srgbClr val="003B4F"/>
+                </a:solidFill>
+                <a:latin typeface="Courier"/>
+              </a:rPr>
+              <a:t>)  </a:t>
+            </a:r>
+            <a:br/>
+            <a:r>
+              <a:rPr>
+                <a:solidFill>
+                  <a:srgbClr val="003B4F"/>
+                </a:solidFill>
+                <a:latin typeface="Courier"/>
+              </a:rPr>
+              <a:t>}</a:t>
+            </a:r>
+            <a:br/>
+            <a:r>
+              <a:rPr b="1">
+                <a:solidFill>
+                  <a:srgbClr val="003B4F"/>
+                </a:solidFill>
+                <a:latin typeface="Courier"/>
+              </a:rPr>
+              <a:t>if</a:t>
+            </a:r>
+            <a:r>
+              <a:rPr>
+                <a:solidFill>
+                  <a:srgbClr val="003B4F"/>
+                </a:solidFill>
+                <a:latin typeface="Courier"/>
+              </a:rPr>
+              <a:t>(</a:t>
+            </a:r>
+            <a:r>
+              <a:rPr>
+                <a:solidFill>
+                  <a:srgbClr val="5E5E5E"/>
+                </a:solidFill>
+                <a:latin typeface="Courier"/>
+              </a:rPr>
+              <a:t>!</a:t>
+            </a:r>
+            <a:r>
+              <a:rPr>
+                <a:solidFill>
+                  <a:srgbClr val="4758AB"/>
+                </a:solidFill>
+                <a:latin typeface="Courier"/>
+              </a:rPr>
+              <a:t>requireNamespace</a:t>
+            </a:r>
+            <a:r>
+              <a:rPr>
+                <a:solidFill>
+                  <a:srgbClr val="003B4F"/>
+                </a:solidFill>
+                <a:latin typeface="Courier"/>
+              </a:rPr>
+              <a:t>(</a:t>
+            </a:r>
+            <a:r>
+              <a:rPr>
+                <a:solidFill>
+                  <a:srgbClr val="20794D"/>
+                </a:solidFill>
+                <a:latin typeface="Courier"/>
+              </a:rPr>
+              <a:t>"ggtreeExtra"</a:t>
+            </a:r>
+            <a:r>
+              <a:rPr>
+                <a:solidFill>
+                  <a:srgbClr val="003B4F"/>
+                </a:solidFill>
+                <a:latin typeface="Courier"/>
+              </a:rPr>
+              <a:t>, </a:t>
+            </a:r>
+            <a:r>
+              <a:rPr>
+                <a:solidFill>
+                  <a:srgbClr val="657422"/>
+                </a:solidFill>
+                <a:latin typeface="Courier"/>
+              </a:rPr>
+              <a:t>quietly =</a:t>
+            </a:r>
+            <a:r>
+              <a:rPr>
+                <a:solidFill>
+                  <a:srgbClr val="003B4F"/>
+                </a:solidFill>
+                <a:latin typeface="Courier"/>
+              </a:rPr>
+              <a:t> </a:t>
+            </a:r>
+            <a:r>
+              <a:rPr>
+                <a:solidFill>
+                  <a:srgbClr val="8F5902"/>
+                </a:solidFill>
+                <a:latin typeface="Courier"/>
+              </a:rPr>
+              <a:t>TRUE</a:t>
+            </a:r>
+            <a:r>
+              <a:rPr>
+                <a:solidFill>
+                  <a:srgbClr val="003B4F"/>
+                </a:solidFill>
+                <a:latin typeface="Courier"/>
+              </a:rPr>
+              <a:t>)){</a:t>
+            </a:r>
+            <a:br/>
+            <a:r>
+              <a:rPr>
+                <a:solidFill>
+                  <a:srgbClr val="003B4F"/>
+                </a:solidFill>
+                <a:latin typeface="Courier"/>
+              </a:rPr>
+              <a:t>BiocManager</a:t>
+            </a:r>
+            <a:r>
+              <a:rPr>
+                <a:solidFill>
+                  <a:srgbClr val="5E5E5E"/>
+                </a:solidFill>
+                <a:latin typeface="Courier"/>
+              </a:rPr>
+              <a:t>::</a:t>
+            </a:r>
+            <a:r>
+              <a:rPr>
+                <a:solidFill>
+                  <a:srgbClr val="4758AB"/>
+                </a:solidFill>
+                <a:latin typeface="Courier"/>
+              </a:rPr>
+              <a:t>install</a:t>
+            </a:r>
+            <a:r>
+              <a:rPr>
+                <a:solidFill>
+                  <a:srgbClr val="003B4F"/>
+                </a:solidFill>
+                <a:latin typeface="Courier"/>
+              </a:rPr>
+              <a:t>(</a:t>
+            </a:r>
+            <a:r>
+              <a:rPr>
+                <a:solidFill>
+                  <a:srgbClr val="20794D"/>
+                </a:solidFill>
+                <a:latin typeface="Courier"/>
+              </a:rPr>
+              <a:t>"ggtreeExtra"</a:t>
+            </a:r>
+            <a:r>
+              <a:rPr>
+                <a:solidFill>
+                  <a:srgbClr val="003B4F"/>
+                </a:solidFill>
+                <a:latin typeface="Courier"/>
+              </a:rPr>
+              <a:t>)  </a:t>
+            </a:r>
+            <a:br/>
+            <a:r>
+              <a:rPr>
+                <a:solidFill>
+                  <a:srgbClr val="003B4F"/>
+                </a:solidFill>
+                <a:latin typeface="Courier"/>
+              </a:rPr>
+              <a:t>}</a:t>
+            </a:r>
+          </a:p>
+        </p:txBody>
+      </p:sp>
+    </p:spTree>
+  </p:cSld>
+</p:sld>
+</file>
+
+<file path=ppt/slides/slide9.xml><?xml version="1.0" encoding="utf-8"?>
 <p:sld xmlns:a="http://schemas.openxmlformats.org/drawingml/2006/main" xmlns:r="http://schemas.openxmlformats.org/officeDocument/2006/relationships" xmlns:p="http://schemas.openxmlformats.org/presentationml/2006/main">
   <p:cSld>
     <p:spTree>
@@ -4937,332 +6862,6 @@
           </a:ln>
         </p:spPr>
       </p:pic>
-    </p:spTree>
-  </p:cSld>
-</p:sld>
-</file>
-
-<file path=ppt/slides/slide8.xml><?xml version="1.0" encoding="utf-8"?>
-<p:sld xmlns:a="http://schemas.openxmlformats.org/drawingml/2006/main" xmlns:r="http://schemas.openxmlformats.org/officeDocument/2006/relationships" xmlns:p="http://schemas.openxmlformats.org/presentationml/2006/main">
-  <p:cSld>
-    <p:spTree>
-      <p:nvGrpSpPr>
-        <p:cNvPr id="1" name=""/>
-        <p:cNvGrpSpPr/>
-        <p:nvPr/>
-      </p:nvGrpSpPr>
-      <p:grpSpPr>
-        <a:xfrm>
-          <a:off x="0" y="0"/>
-          <a:ext cx="0" cy="0"/>
-          <a:chOff x="0" y="0"/>
-          <a:chExt cx="0" cy="0"/>
-        </a:xfrm>
-      </p:grpSpPr>
-      <p:sp>
-        <p:nvSpPr>
-          <p:cNvPr id="2" name="Title 1">
-            <a:extLst>
-              <a:ext uri="{FF2B5EF4-FFF2-40B4-BE49-F238E27FC236}">
-                <a16:creationId xmlns:a16="http://schemas.microsoft.com/office/drawing/2014/main" id="{FFEB6B4C-B951-9E3B-FF44-6DAFB89CD0CA}"/>
-              </a:ext>
-            </a:extLst>
-          </p:cNvPr>
-          <p:cNvSpPr>
-            <a:spLocks noGrp="1"/>
-          </p:cNvSpPr>
-          <p:nvPr>
-            <p:ph type="title"/>
-          </p:nvPr>
-        </p:nvSpPr>
-        <p:spPr/>
-        <p:txBody>
-          <a:bodyPr/>
-          <a:lstStyle/>
-          <a:p>
-            <a:pPr lvl="0" indent="0" marL="0">
-              <a:buNone/>
-            </a:pPr>
-            <a:r>
-              <a:rPr/>
-              <a:t>Example 1</a:t>
-            </a:r>
-          </a:p>
-        </p:txBody>
-      </p:sp>
-      <p:pic>
-        <p:nvPicPr>
-          <p:cNvPr descr="images/ED_FIG7.jpg" id="0" name="Picture 1"/>
-          <p:cNvPicPr>
-            <a:picLocks noGrp="1" noChangeAspect="1"/>
-          </p:cNvPicPr>
-          <p:nvPr/>
-        </p:nvPicPr>
-        <p:blipFill>
-          <a:blip r:embed="rId2"/>
-          <a:stretch>
-            <a:fillRect/>
-          </a:stretch>
-        </p:blipFill>
-        <p:spPr bwMode="auto">
-          <a:xfrm>
-            <a:off x="2540000" y="1816100"/>
-            <a:ext cx="7099300" cy="3835400"/>
-          </a:xfrm>
-          <a:prstGeom prst="rect">
-            <a:avLst/>
-          </a:prstGeom>
-          <a:noFill/>
-          <a:ln w="9525">
-            <a:noFill/>
-            <a:headEnd/>
-            <a:tailEnd/>
-          </a:ln>
-        </p:spPr>
-      </p:pic>
-      <p:sp>
-        <p:nvSpPr>
-          <p:cNvPr id="1" name="TextBox 3"/>
-          <p:cNvSpPr txBox="1"/>
-          <p:nvPr/>
-        </p:nvSpPr>
-        <p:spPr>
-          <a:xfrm>
-            <a:off x="838200" y="5651500"/>
-            <a:ext cx="10515600" cy="508000"/>
-          </a:xfrm>
-          <a:prstGeom prst="rect">
-            <a:avLst/>
-          </a:prstGeom>
-          <a:noFill/>
-        </p:spPr>
-        <p:txBody>
-          <a:bodyPr/>
-          <a:lstStyle/>
-          <a:p>
-            <a:pPr lvl="0" indent="0" marL="0" algn="ctr">
-              <a:buNone/>
-            </a:pPr>
-            <a:r>
-              <a:rPr/>
-              <a:t>Shen, et al. Nature Biomedical Engineering, 2024</a:t>
-            </a:r>
-          </a:p>
-        </p:txBody>
-      </p:sp>
-    </p:spTree>
-  </p:cSld>
-</p:sld>
-</file>
-
-<file path=ppt/slides/slide9.xml><?xml version="1.0" encoding="utf-8"?>
-<p:sld xmlns:a="http://schemas.openxmlformats.org/drawingml/2006/main" xmlns:r="http://schemas.openxmlformats.org/officeDocument/2006/relationships" xmlns:p="http://schemas.openxmlformats.org/presentationml/2006/main">
-  <p:cSld>
-    <p:spTree>
-      <p:nvGrpSpPr>
-        <p:cNvPr id="1" name=""/>
-        <p:cNvGrpSpPr/>
-        <p:nvPr/>
-      </p:nvGrpSpPr>
-      <p:grpSpPr>
-        <a:xfrm>
-          <a:off x="0" y="0"/>
-          <a:ext cx="0" cy="0"/>
-          <a:chOff x="0" y="0"/>
-          <a:chExt cx="0" cy="0"/>
-        </a:xfrm>
-      </p:grpSpPr>
-      <p:sp>
-        <p:nvSpPr>
-          <p:cNvPr id="2" name="Title 1">
-            <a:extLst>
-              <a:ext uri="{FF2B5EF4-FFF2-40B4-BE49-F238E27FC236}">
-                <a16:creationId xmlns:a16="http://schemas.microsoft.com/office/drawing/2014/main" id="{1F42567C-29A1-32BF-618A-40D311A39CF7}"/>
-              </a:ext>
-            </a:extLst>
-          </p:cNvPr>
-          <p:cNvSpPr>
-            <a:spLocks noGrp="1"/>
-          </p:cNvSpPr>
-          <p:nvPr>
-            <p:ph type="title"/>
-          </p:nvPr>
-        </p:nvSpPr>
-        <p:spPr>
-          <a:xfrm>
-            <a:off x="839788" y="457200"/>
-            <a:ext cx="3932237" cy="1600200"/>
-          </a:xfrm>
-        </p:spPr>
-        <p:txBody>
-          <a:bodyPr/>
-          <a:lstStyle/>
-          <a:p>
-            <a:pPr lvl="0" indent="0" marL="0">
-              <a:buNone/>
-            </a:pPr>
-            <a:r>
-              <a:rPr/>
-              <a:t>Example 1</a:t>
-            </a:r>
-          </a:p>
-        </p:txBody>
-      </p:sp>
-      <p:sp>
-        <p:nvSpPr>
-          <p:cNvPr id="4" name="Text Placeholder 3">
-            <a:extLst>
-              <a:ext uri="{FF2B5EF4-FFF2-40B4-BE49-F238E27FC236}">
-                <a16:creationId xmlns:a16="http://schemas.microsoft.com/office/drawing/2014/main" id="{E0D7D3B2-4149-01B8-85E5-1D320CACC8BE}"/>
-              </a:ext>
-            </a:extLst>
-          </p:cNvPr>
-          <p:cNvSpPr>
-            <a:spLocks noGrp="1"/>
-          </p:cNvSpPr>
-          <p:nvPr>
-            <p:ph idx="2" sz="half" type="body"/>
-          </p:nvPr>
-        </p:nvSpPr>
-        <p:spPr/>
-        <p:txBody>
-          <a:bodyPr/>
-          <a:lstStyle/>
-          <a:p>
-            <a:pPr lvl="0" indent="0" marL="0">
-              <a:spcBef>
-                <a:spcPts val="3000"/>
-              </a:spcBef>
-              <a:buNone/>
-            </a:pPr>
-            <a:r>
-              <a:rPr b="1"/>
-              <a:t>What’s the network?</a:t>
-            </a:r>
-          </a:p>
-          <a:p>
-            <a:pPr lvl="0" indent="0" marL="0">
-              <a:buNone/>
-            </a:pPr>
-            <a:r>
-              <a:rPr b="1"/>
-              <a:t>Nodes</a:t>
-            </a:r>
-            <a:r>
-              <a:rPr/>
-              <a:t>:</a:t>
-            </a:r>
-          </a:p>
-          <a:p>
-            <a:pPr lvl="0"/>
-            <a:r>
-              <a:rPr/>
-              <a:t>Wearable data: Step, HR, and CGM (continuous glucose monitoring) data</a:t>
-            </a:r>
-          </a:p>
-          <a:p>
-            <a:pPr lvl="0"/>
-            <a:r>
-              <a:rPr/>
-              <a:t>Omics data: Proteins, metabolites, and lipids</a:t>
-            </a:r>
-          </a:p>
-          <a:p>
-            <a:pPr lvl="0" indent="0" marL="0">
-              <a:buNone/>
-            </a:pPr>
-            <a:r>
-              <a:rPr b="1"/>
-              <a:t>Edges</a:t>
-            </a:r>
-            <a:r>
-              <a:rPr/>
-              <a:t>:</a:t>
-            </a:r>
-          </a:p>
-          <a:p>
-            <a:pPr lvl="0"/>
-            <a:r>
-              <a:rPr/>
-              <a:t>Lagged correlations</a:t>
-            </a:r>
-          </a:p>
-          <a:p>
-            <a:pPr lvl="0"/>
-            <a:r>
-              <a:rPr/>
-              <a:t>Blue: negative correlations</a:t>
-            </a:r>
-          </a:p>
-          <a:p>
-            <a:pPr lvl="0"/>
-            <a:r>
-              <a:rPr/>
-              <a:t>Red: positive correlations</a:t>
-            </a:r>
-          </a:p>
-        </p:txBody>
-      </p:sp>
-      <p:pic>
-        <p:nvPicPr>
-          <p:cNvPr descr="images/ED_FIG7.jpg" id="0" name="Picture 1"/>
-          <p:cNvPicPr>
-            <a:picLocks noGrp="1" noChangeAspect="1"/>
-          </p:cNvPicPr>
-          <p:nvPr/>
-        </p:nvPicPr>
-        <p:blipFill>
-          <a:blip r:embed="rId2"/>
-          <a:stretch>
-            <a:fillRect/>
-          </a:stretch>
-        </p:blipFill>
-        <p:spPr bwMode="auto">
-          <a:xfrm>
-            <a:off x="5181600" y="1485900"/>
-            <a:ext cx="6172200" cy="3327400"/>
-          </a:xfrm>
-          <a:prstGeom prst="rect">
-            <a:avLst/>
-          </a:prstGeom>
-          <a:noFill/>
-          <a:ln w="9525">
-            <a:noFill/>
-            <a:headEnd/>
-            <a:tailEnd/>
-          </a:ln>
-        </p:spPr>
-      </p:pic>
-      <p:sp>
-        <p:nvSpPr>
-          <p:cNvPr id="1" name="TextBox 3"/>
-          <p:cNvSpPr txBox="1"/>
-          <p:nvPr/>
-        </p:nvSpPr>
-        <p:spPr>
-          <a:xfrm>
-            <a:off x="5181600" y="5334000"/>
-            <a:ext cx="6172200" cy="508000"/>
-          </a:xfrm>
-          <a:prstGeom prst="rect">
-            <a:avLst/>
-          </a:prstGeom>
-          <a:noFill/>
-        </p:spPr>
-        <p:txBody>
-          <a:bodyPr/>
-          <a:lstStyle/>
-          <a:p>
-            <a:pPr lvl="0" indent="0" marL="0" algn="ctr">
-              <a:buNone/>
-            </a:pPr>
-            <a:r>
-              <a:rPr/>
-              <a:t>Shen, et al. Nature Biomedical Engineering, 2024</a:t>
-            </a:r>
-          </a:p>
-        </p:txBody>
-      </p:sp>
     </p:spTree>
   </p:cSld>
 </p:sld>

</xml_diff>